<commit_message>
Updates to 15.4 and Appedicies
Updated text on section 15.4. Also removed non-working problems from appendix 1 and 2.
</commit_message>
<xml_diff>
--- a/Lecture Slides/VideoLectureSlides/1.2.pptx
+++ b/Lecture Slides/VideoLectureSlides/1.2.pptx
@@ -590,7 +590,7 @@
           <a:p>
             <a:fld id="{1AA1AB63-216F-4D5B-8811-CCB935E98D4A}" type="datetimeFigureOut">
               <a:rPr lang="en-US" smtClean="0"/>
-              <a:t>6/1/2021</a:t>
+              <a:t>8/28/2023</a:t>
             </a:fld>
             <a:endParaRPr lang="en-US"/>
           </a:p>
@@ -4139,8 +4139,8 @@
           </a:p>
         </p:txBody>
       </p:sp>
-      <mc:AlternateContent xmlns:mc="http://schemas.openxmlformats.org/markup-compatibility/2006" xmlns:a14="http://schemas.microsoft.com/office/drawing/2010/main">
-        <mc:Choice Requires="a14">
+      <mc:AlternateContent xmlns:mc="http://schemas.openxmlformats.org/markup-compatibility/2006">
+        <mc:Choice xmlns:a14="http://schemas.microsoft.com/office/drawing/2010/main" Requires="a14">
           <p:sp>
             <p:nvSpPr>
               <p:cNvPr id="3" name="Content Placeholder 2">
@@ -4166,7 +4166,7 @@
               <a:p>
                 <a:r>
                   <a:rPr lang="en-US" dirty="0"/>
-                  <a:t>Finally, we have the acceleration, which is the rate of chance of the velocity over the rate of change of time.</a:t>
+                  <a:t>Finally, we have the acceleration, which is the rate of change of the velocity over the rate of change of time.</a:t>
                 </a:r>
               </a:p>
               <a:p>
@@ -4435,7 +4435,7 @@
             </p:txBody>
           </p:sp>
         </mc:Choice>
-        <mc:Fallback xmlns="">
+        <mc:Fallback>
           <p:sp>
             <p:nvSpPr>
               <p:cNvPr id="3" name="Content Placeholder 2">
@@ -14106,6 +14106,21 @@
 </file>
 
 <file path=customXml/item1.xml><?xml version="1.0" encoding="utf-8"?>
+<p:properties xmlns:p="http://schemas.microsoft.com/office/2006/metadata/properties" xmlns:xsi="http://www.w3.org/2001/XMLSchema-instance" xmlns:pc="http://schemas.microsoft.com/office/infopath/2007/PartnerControls">
+  <documentManagement/>
+</p:properties>
+</file>
+
+<file path=customXml/item2.xml><?xml version="1.0" encoding="utf-8"?>
+<?mso-contentType ?>
+<FormTemplates xmlns="http://schemas.microsoft.com/sharepoint/v3/contenttype/forms">
+  <Display>DocumentLibraryForm</Display>
+  <Edit>DocumentLibraryForm</Edit>
+  <New>DocumentLibraryForm</New>
+</FormTemplates>
+</file>
+
+<file path=customXml/item3.xml><?xml version="1.0" encoding="utf-8"?>
 <ct:contentTypeSchema xmlns:ct="http://schemas.microsoft.com/office/2006/metadata/contentType" xmlns:ma="http://schemas.microsoft.com/office/2006/metadata/properties/metaAttributes" ct:_="" ma:_="" ma:contentTypeName="Document" ma:contentTypeID="0x010100A06DF21F5BB2734A800ED30F3F452129" ma:contentTypeVersion="12" ma:contentTypeDescription="Create a new document." ma:contentTypeScope="" ma:versionID="544d96a5fbac5de9d5d902b535c73fb2">
   <xsd:schema xmlns:xsd="http://www.w3.org/2001/XMLSchema" xmlns:xs="http://www.w3.org/2001/XMLSchema" xmlns:p="http://schemas.microsoft.com/office/2006/metadata/properties" xmlns:ns3="90d05cb5-950f-4f68-bc2c-e17794455b92" xmlns:ns4="b4eab9fa-dbb0-4082-8491-8bd54207a265" targetNamespace="http://schemas.microsoft.com/office/2006/metadata/properties" ma:root="true" ma:fieldsID="7a710efc71c2169bf9c05e5a40dddf12" ns3:_="" ns4:_="">
     <xsd:import namespace="90d05cb5-950f-4f68-bc2c-e17794455b92"/>
@@ -14322,22 +14337,24 @@
 </ct:contentTypeSchema>
 </file>
 
-<file path=customXml/item2.xml><?xml version="1.0" encoding="utf-8"?>
-<?mso-contentType ?>
-<FormTemplates xmlns="http://schemas.microsoft.com/sharepoint/v3/contenttype/forms">
-  <Display>DocumentLibraryForm</Display>
-  <Edit>DocumentLibraryForm</Edit>
-  <New>DocumentLibraryForm</New>
-</FormTemplates>
+<file path=customXml/itemProps1.xml><?xml version="1.0" encoding="utf-8"?>
+<ds:datastoreItem xmlns:ds="http://schemas.openxmlformats.org/officeDocument/2006/customXml" ds:itemID="{52EB1464-66D1-425A-BBB5-7A9312BBE9C4}">
+  <ds:schemaRefs>
+    <ds:schemaRef ds:uri="http://schemas.microsoft.com/office/2006/metadata/properties"/>
+    <ds:schemaRef ds:uri="http://schemas.microsoft.com/office/infopath/2007/PartnerControls"/>
+  </ds:schemaRefs>
+</ds:datastoreItem>
 </file>
 
-<file path=customXml/item3.xml><?xml version="1.0" encoding="utf-8"?>
-<p:properties xmlns:p="http://schemas.microsoft.com/office/2006/metadata/properties" xmlns:xsi="http://www.w3.org/2001/XMLSchema-instance" xmlns:pc="http://schemas.microsoft.com/office/infopath/2007/PartnerControls">
-  <documentManagement/>
-</p:properties>
+<file path=customXml/itemProps2.xml><?xml version="1.0" encoding="utf-8"?>
+<ds:datastoreItem xmlns:ds="http://schemas.openxmlformats.org/officeDocument/2006/customXml" ds:itemID="{F5CF5F32-56DC-4068-8B04-457CF34A96F3}">
+  <ds:schemaRefs>
+    <ds:schemaRef ds:uri="http://schemas.microsoft.com/sharepoint/v3/contenttype/forms"/>
+  </ds:schemaRefs>
+</ds:datastoreItem>
 </file>
 
-<file path=customXml/itemProps1.xml><?xml version="1.0" encoding="utf-8"?>
+<file path=customXml/itemProps3.xml><?xml version="1.0" encoding="utf-8"?>
 <ds:datastoreItem xmlns:ds="http://schemas.openxmlformats.org/officeDocument/2006/customXml" ds:itemID="{A43B8A4B-79FE-4529-931C-D64224FA70E3}">
   <ds:schemaRefs>
     <ds:schemaRef ds:uri="http://schemas.microsoft.com/office/2006/metadata/contentType"/>
@@ -14354,21 +14371,4 @@
     <ds:schemaRef ds:uri="http://schemas.microsoft.com/internal/obd"/>
   </ds:schemaRefs>
 </ds:datastoreItem>
-</file>
-
-<file path=customXml/itemProps2.xml><?xml version="1.0" encoding="utf-8"?>
-<ds:datastoreItem xmlns:ds="http://schemas.openxmlformats.org/officeDocument/2006/customXml" ds:itemID="{F5CF5F32-56DC-4068-8B04-457CF34A96F3}">
-  <ds:schemaRefs>
-    <ds:schemaRef ds:uri="http://schemas.microsoft.com/sharepoint/v3/contenttype/forms"/>
-  </ds:schemaRefs>
-</ds:datastoreItem>
-</file>
-
-<file path=customXml/itemProps3.xml><?xml version="1.0" encoding="utf-8"?>
-<ds:datastoreItem xmlns:ds="http://schemas.openxmlformats.org/officeDocument/2006/customXml" ds:itemID="{52EB1464-66D1-425A-BBB5-7A9312BBE9C4}">
-  <ds:schemaRefs>
-    <ds:schemaRef ds:uri="http://schemas.microsoft.com/office/2006/metadata/properties"/>
-    <ds:schemaRef ds:uri="http://schemas.microsoft.com/office/infopath/2007/PartnerControls"/>
-  </ds:schemaRefs>
-</ds:datastoreItem>
 </file>
</xml_diff>